<commit_message>
update ttl and add version number in decision tree
remove bio environments in ttl, make lab and experiment setting subclass of active human occupation site
</commit_message>
<xml_diff>
--- a/vocabulary/SampledFeatureDecisionTreeV20210703.pptx
+++ b/vocabulary/SampledFeatureDecisionTreeV20210703.pptx
@@ -243,7 +243,7 @@
           <a:p>
             <a:fld id="{47AA5A20-FE08-4F04-A6A9-90A748025DF5}" type="datetimeFigureOut">
               <a:rPr lang="en-US" smtClean="0"/>
-              <a:t>7/3/2021</a:t>
+              <a:t>7/9/2021</a:t>
             </a:fld>
             <a:endParaRPr lang="en-US"/>
           </a:p>
@@ -413,7 +413,7 @@
           <a:p>
             <a:fld id="{47AA5A20-FE08-4F04-A6A9-90A748025DF5}" type="datetimeFigureOut">
               <a:rPr lang="en-US" smtClean="0"/>
-              <a:t>7/3/2021</a:t>
+              <a:t>7/9/2021</a:t>
             </a:fld>
             <a:endParaRPr lang="en-US"/>
           </a:p>
@@ -593,7 +593,7 @@
           <a:p>
             <a:fld id="{47AA5A20-FE08-4F04-A6A9-90A748025DF5}" type="datetimeFigureOut">
               <a:rPr lang="en-US" smtClean="0"/>
-              <a:t>7/3/2021</a:t>
+              <a:t>7/9/2021</a:t>
             </a:fld>
             <a:endParaRPr lang="en-US"/>
           </a:p>
@@ -763,7 +763,7 @@
           <a:p>
             <a:fld id="{47AA5A20-FE08-4F04-A6A9-90A748025DF5}" type="datetimeFigureOut">
               <a:rPr lang="en-US" smtClean="0"/>
-              <a:t>7/3/2021</a:t>
+              <a:t>7/9/2021</a:t>
             </a:fld>
             <a:endParaRPr lang="en-US"/>
           </a:p>
@@ -1007,7 +1007,7 @@
           <a:p>
             <a:fld id="{47AA5A20-FE08-4F04-A6A9-90A748025DF5}" type="datetimeFigureOut">
               <a:rPr lang="en-US" smtClean="0"/>
-              <a:t>7/3/2021</a:t>
+              <a:t>7/9/2021</a:t>
             </a:fld>
             <a:endParaRPr lang="en-US"/>
           </a:p>
@@ -1239,7 +1239,7 @@
           <a:p>
             <a:fld id="{47AA5A20-FE08-4F04-A6A9-90A748025DF5}" type="datetimeFigureOut">
               <a:rPr lang="en-US" smtClean="0"/>
-              <a:t>7/3/2021</a:t>
+              <a:t>7/9/2021</a:t>
             </a:fld>
             <a:endParaRPr lang="en-US"/>
           </a:p>
@@ -1606,7 +1606,7 @@
           <a:p>
             <a:fld id="{47AA5A20-FE08-4F04-A6A9-90A748025DF5}" type="datetimeFigureOut">
               <a:rPr lang="en-US" smtClean="0"/>
-              <a:t>7/3/2021</a:t>
+              <a:t>7/9/2021</a:t>
             </a:fld>
             <a:endParaRPr lang="en-US"/>
           </a:p>
@@ -1724,7 +1724,7 @@
           <a:p>
             <a:fld id="{47AA5A20-FE08-4F04-A6A9-90A748025DF5}" type="datetimeFigureOut">
               <a:rPr lang="en-US" smtClean="0"/>
-              <a:t>7/3/2021</a:t>
+              <a:t>7/9/2021</a:t>
             </a:fld>
             <a:endParaRPr lang="en-US"/>
           </a:p>
@@ -1819,7 +1819,7 @@
           <a:p>
             <a:fld id="{47AA5A20-FE08-4F04-A6A9-90A748025DF5}" type="datetimeFigureOut">
               <a:rPr lang="en-US" smtClean="0"/>
-              <a:t>7/3/2021</a:t>
+              <a:t>7/9/2021</a:t>
             </a:fld>
             <a:endParaRPr lang="en-US"/>
           </a:p>
@@ -2096,7 +2096,7 @@
           <a:p>
             <a:fld id="{47AA5A20-FE08-4F04-A6A9-90A748025DF5}" type="datetimeFigureOut">
               <a:rPr lang="en-US" smtClean="0"/>
-              <a:t>7/3/2021</a:t>
+              <a:t>7/9/2021</a:t>
             </a:fld>
             <a:endParaRPr lang="en-US"/>
           </a:p>
@@ -2353,7 +2353,7 @@
           <a:p>
             <a:fld id="{47AA5A20-FE08-4F04-A6A9-90A748025DF5}" type="datetimeFigureOut">
               <a:rPr lang="en-US" smtClean="0"/>
-              <a:t>7/3/2021</a:t>
+              <a:t>7/9/2021</a:t>
             </a:fld>
             <a:endParaRPr lang="en-US"/>
           </a:p>
@@ -2566,7 +2566,7 @@
           <a:p>
             <a:fld id="{47AA5A20-FE08-4F04-A6A9-90A748025DF5}" type="datetimeFigureOut">
               <a:rPr lang="en-US" smtClean="0"/>
-              <a:t>7/3/2021</a:t>
+              <a:t>7/9/2021</a:t>
             </a:fld>
             <a:endParaRPr lang="en-US"/>
           </a:p>
@@ -5657,6 +5657,11 @@
               <a:rPr lang="en-US" sz="3600" dirty="0"/>
               <a:t>iSamples Sampled Feature Decision Tree  v. </a:t>
             </a:r>
+            <a:r>
+              <a:rPr lang="en-US" sz="3600"/>
+              <a:t>20210703 </a:t>
+            </a:r>
+            <a:endParaRPr lang="en-US" sz="3600" dirty="0"/>
           </a:p>
         </p:txBody>
       </p:sp>

</xml_diff>